<commit_message>
Separate content from styles
</commit_message>
<xml_diff>
--- a/outputs/Textbook.pptx
+++ b/outputs/Textbook.pptx
@@ -291,7 +291,7 @@
             <a:fld id="{1D8BD707-D9CF-40AE-B4C6-C98DA3205C09}" type="datetimeFigureOut">
               <a:rPr lang="en-US" smtClean="0"/>
               <a:pPr/>
-              <a:t>11/20/2016</a:t>
+              <a:t>11/21/2016</a:t>
             </a:fld>
             <a:endParaRPr lang="en-US"/>
           </a:p>
@@ -458,7 +458,7 @@
             <a:fld id="{1D8BD707-D9CF-40AE-B4C6-C98DA3205C09}" type="datetimeFigureOut">
               <a:rPr lang="en-US" smtClean="0"/>
               <a:pPr/>
-              <a:t>11/20/2016</a:t>
+              <a:t>11/21/2016</a:t>
             </a:fld>
             <a:endParaRPr lang="en-US"/>
           </a:p>
@@ -635,7 +635,7 @@
             <a:fld id="{1D8BD707-D9CF-40AE-B4C6-C98DA3205C09}" type="datetimeFigureOut">
               <a:rPr lang="en-US" smtClean="0"/>
               <a:pPr/>
-              <a:t>11/20/2016</a:t>
+              <a:t>11/21/2016</a:t>
             </a:fld>
             <a:endParaRPr lang="en-US"/>
           </a:p>
@@ -802,7 +802,7 @@
             <a:fld id="{1D8BD707-D9CF-40AE-B4C6-C98DA3205C09}" type="datetimeFigureOut">
               <a:rPr lang="en-US" smtClean="0"/>
               <a:pPr/>
-              <a:t>11/20/2016</a:t>
+              <a:t>11/21/2016</a:t>
             </a:fld>
             <a:endParaRPr lang="en-US"/>
           </a:p>
@@ -1045,7 +1045,7 @@
             <a:fld id="{1D8BD707-D9CF-40AE-B4C6-C98DA3205C09}" type="datetimeFigureOut">
               <a:rPr lang="en-US" smtClean="0"/>
               <a:pPr/>
-              <a:t>11/20/2016</a:t>
+              <a:t>11/21/2016</a:t>
             </a:fld>
             <a:endParaRPr lang="en-US"/>
           </a:p>
@@ -1330,7 +1330,7 @@
             <a:fld id="{1D8BD707-D9CF-40AE-B4C6-C98DA3205C09}" type="datetimeFigureOut">
               <a:rPr lang="en-US" smtClean="0"/>
               <a:pPr/>
-              <a:t>11/20/2016</a:t>
+              <a:t>11/21/2016</a:t>
             </a:fld>
             <a:endParaRPr lang="en-US"/>
           </a:p>
@@ -1749,7 +1749,7 @@
             <a:fld id="{1D8BD707-D9CF-40AE-B4C6-C98DA3205C09}" type="datetimeFigureOut">
               <a:rPr lang="en-US" smtClean="0"/>
               <a:pPr/>
-              <a:t>11/20/2016</a:t>
+              <a:t>11/21/2016</a:t>
             </a:fld>
             <a:endParaRPr lang="en-US"/>
           </a:p>
@@ -1864,7 +1864,7 @@
             <a:fld id="{1D8BD707-D9CF-40AE-B4C6-C98DA3205C09}" type="datetimeFigureOut">
               <a:rPr lang="en-US" smtClean="0"/>
               <a:pPr/>
-              <a:t>11/20/2016</a:t>
+              <a:t>11/21/2016</a:t>
             </a:fld>
             <a:endParaRPr lang="en-US"/>
           </a:p>
@@ -1956,7 +1956,7 @@
             <a:fld id="{1D8BD707-D9CF-40AE-B4C6-C98DA3205C09}" type="datetimeFigureOut">
               <a:rPr lang="en-US" smtClean="0"/>
               <a:pPr/>
-              <a:t>11/20/2016</a:t>
+              <a:t>11/21/2016</a:t>
             </a:fld>
             <a:endParaRPr lang="en-US"/>
           </a:p>
@@ -2230,7 +2230,7 @@
             <a:fld id="{1D8BD707-D9CF-40AE-B4C6-C98DA3205C09}" type="datetimeFigureOut">
               <a:rPr lang="en-US" smtClean="0"/>
               <a:pPr/>
-              <a:t>11/20/2016</a:t>
+              <a:t>11/21/2016</a:t>
             </a:fld>
             <a:endParaRPr lang="en-US"/>
           </a:p>
@@ -2480,7 +2480,7 @@
             <a:fld id="{1D8BD707-D9CF-40AE-B4C6-C98DA3205C09}" type="datetimeFigureOut">
               <a:rPr lang="en-US" smtClean="0"/>
               <a:pPr/>
-              <a:t>11/20/2016</a:t>
+              <a:t>11/21/2016</a:t>
             </a:fld>
             <a:endParaRPr lang="en-US"/>
           </a:p>
@@ -2690,7 +2690,7 @@
             <a:fld id="{1D8BD707-D9CF-40AE-B4C6-C98DA3205C09}" type="datetimeFigureOut">
               <a:rPr lang="en-US" smtClean="0"/>
               <a:pPr/>
-              <a:t>11/20/2016</a:t>
+              <a:t>11/21/2016</a:t>
             </a:fld>
             <a:endParaRPr lang="en-US"/>
           </a:p>
@@ -3063,6 +3063,55 @@
       </p:grpSpPr>
       <p:sp>
         <p:nvSpPr>
+          <p:cNvPr id="2" name="Rectangle 1"/>
+          <p:cNvSpPr/>
+          <p:nvPr/>
+        </p:nvSpPr>
+        <p:spPr>
+          <a:xfrm>
+            <a:off x="838200" y="6248400"/>
+            <a:ext cx="5261762" cy="914400"/>
+          </a:xfrm>
+          <a:prstGeom prst="rect">
+            <a:avLst/>
+          </a:prstGeom>
+          <a:solidFill>
+            <a:schemeClr val="accent1">
+              <a:lumMod val="20000"/>
+              <a:lumOff val="80000"/>
+            </a:schemeClr>
+          </a:solidFill>
+          <a:ln>
+            <a:noFill/>
+          </a:ln>
+        </p:spPr>
+        <p:style>
+          <a:lnRef idx="2">
+            <a:schemeClr val="accent1">
+              <a:shade val="50000"/>
+            </a:schemeClr>
+          </a:lnRef>
+          <a:fillRef idx="1">
+            <a:schemeClr val="accent1"/>
+          </a:fillRef>
+          <a:effectRef idx="0">
+            <a:schemeClr val="accent1"/>
+          </a:effectRef>
+          <a:fontRef idx="minor">
+            <a:schemeClr val="lt1"/>
+          </a:fontRef>
+        </p:style>
+        <p:txBody>
+          <a:bodyPr rtlCol="0" anchor="ctr"/>
+          <a:lstStyle/>
+          <a:p>
+            <a:pPr algn="ctr"/>
+            <a:endParaRPr lang="en-SG"/>
+          </a:p>
+        </p:txBody>
+      </p:sp>
+      <p:sp>
+        <p:nvSpPr>
           <p:cNvPr id="37" name="TextBox 1"/>
           <p:cNvSpPr txBox="1"/>
           <p:nvPr/>
@@ -4193,14 +4242,6 @@
               </a:rPr>
               <a:t>Dealing with requirements is a complicated task. It is not as simple as writing a wish list.</a:t>
             </a:r>
-            <a:endParaRPr lang="en-SG" sz="1000" dirty="0">
-              <a:solidFill>
-                <a:schemeClr val="tx1">
-                  <a:lumMod val="65000"/>
-                  <a:lumOff val="35000"/>
-                </a:schemeClr>
-              </a:solidFill>
-            </a:endParaRPr>
           </a:p>
         </p:txBody>
       </p:sp>
@@ -4213,7 +4254,7 @@
         <p:spPr>
           <a:xfrm>
             <a:off x="762000" y="3962400"/>
-            <a:ext cx="5417820" cy="3962400"/>
+            <a:ext cx="5417820" cy="3352800"/>
           </a:xfrm>
           <a:prstGeom prst="rect">
             <a:avLst/>
@@ -4602,6 +4643,16 @@
             </a:endParaRPr>
           </a:p>
           <a:p>
+            <a:endParaRPr lang="en-US" sz="1000" b="1" dirty="0" smtClean="0">
+              <a:solidFill>
+                <a:schemeClr val="tx1">
+                  <a:lumMod val="65000"/>
+                  <a:lumOff val="35000"/>
+                </a:schemeClr>
+              </a:solidFill>
+            </a:endParaRPr>
+          </a:p>
+          <a:p>
             <a:r>
               <a:rPr lang="en-US" sz="1000" b="1" dirty="0" smtClean="0">
                 <a:solidFill>
@@ -4730,234 +4781,6 @@
                 </a:schemeClr>
               </a:solidFill>
             </a:endParaRPr>
-          </a:p>
-          <a:p>
-            <a:r>
-              <a:rPr lang="en-US" sz="1000" b="1" dirty="0">
-                <a:solidFill>
-                  <a:schemeClr val="tx1">
-                    <a:lumMod val="65000"/>
-                    <a:lumOff val="35000"/>
-                  </a:schemeClr>
-                </a:solidFill>
-              </a:rPr>
-              <a:t>Q:</a:t>
-            </a:r>
-            <a:r>
-              <a:rPr lang="en-US" sz="1000" dirty="0">
-                <a:solidFill>
-                  <a:schemeClr val="tx1">
-                    <a:lumMod val="65000"/>
-                    <a:lumOff val="35000"/>
-                  </a:schemeClr>
-                </a:solidFill>
-              </a:rPr>
-              <a:t> </a:t>
-            </a:r>
-            <a:r>
-              <a:rPr lang="en-SG" sz="1000" dirty="0">
-                <a:solidFill>
-                  <a:schemeClr val="tx1">
-                    <a:lumMod val="65000"/>
-                    <a:lumOff val="35000"/>
-                  </a:schemeClr>
-                </a:solidFill>
-              </a:rPr>
-              <a:t>Which of </a:t>
-            </a:r>
-            <a:r>
-              <a:rPr lang="en-SG" sz="1000" dirty="0" smtClean="0">
-                <a:solidFill>
-                  <a:schemeClr val="tx1">
-                    <a:lumMod val="65000"/>
-                    <a:lumOff val="35000"/>
-                  </a:schemeClr>
-                </a:solidFill>
-              </a:rPr>
-              <a:t>these </a:t>
-            </a:r>
-            <a:r>
-              <a:rPr lang="en-SG" sz="1000" dirty="0">
-                <a:solidFill>
-                  <a:schemeClr val="tx1">
-                    <a:lumMod val="65000"/>
-                    <a:lumOff val="35000"/>
-                  </a:schemeClr>
-                </a:solidFill>
-              </a:rPr>
-              <a:t>are NFRs?</a:t>
-            </a:r>
-          </a:p>
-          <a:p>
-            <a:r>
-              <a:rPr lang="en-SG" sz="1000" dirty="0">
-                <a:solidFill>
-                  <a:schemeClr val="tx1">
-                    <a:lumMod val="65000"/>
-                    <a:lumOff val="35000"/>
-                  </a:schemeClr>
-                </a:solidFill>
-              </a:rPr>
-              <a:t> </a:t>
-            </a:r>
-            <a:r>
-              <a:rPr lang="en-SG" sz="1000" dirty="0" smtClean="0">
-                <a:solidFill>
-                  <a:schemeClr val="tx1">
-                    <a:lumMod val="65000"/>
-                    <a:lumOff val="35000"/>
-                  </a:schemeClr>
-                </a:solidFill>
-              </a:rPr>
-              <a:t>    [ </a:t>
-            </a:r>
-            <a:r>
-              <a:rPr lang="en-SG" sz="1000" dirty="0">
-                <a:solidFill>
-                  <a:schemeClr val="tx1">
-                    <a:lumMod val="65000"/>
-                    <a:lumOff val="35000"/>
-                  </a:schemeClr>
-                </a:solidFill>
-              </a:rPr>
-              <a:t>] The </a:t>
-            </a:r>
-            <a:r>
-              <a:rPr lang="en-SG" sz="1000" dirty="0" smtClean="0">
-                <a:solidFill>
-                  <a:schemeClr val="tx1">
-                    <a:lumMod val="65000"/>
-                    <a:lumOff val="35000"/>
-                  </a:schemeClr>
-                </a:solidFill>
-              </a:rPr>
-              <a:t>system </a:t>
-            </a:r>
-            <a:r>
-              <a:rPr lang="en-SG" sz="1000" dirty="0">
-                <a:solidFill>
-                  <a:schemeClr val="tx1">
-                    <a:lumMod val="65000"/>
-                    <a:lumOff val="35000"/>
-                  </a:schemeClr>
-                </a:solidFill>
-              </a:rPr>
-              <a:t>must be secure</a:t>
-            </a:r>
-          </a:p>
-          <a:p>
-            <a:r>
-              <a:rPr lang="en-SG" sz="1000" dirty="0">
-                <a:solidFill>
-                  <a:schemeClr val="tx1">
-                    <a:lumMod val="65000"/>
-                    <a:lumOff val="35000"/>
-                  </a:schemeClr>
-                </a:solidFill>
-              </a:rPr>
-              <a:t> </a:t>
-            </a:r>
-            <a:r>
-              <a:rPr lang="en-SG" sz="1000" dirty="0" smtClean="0">
-                <a:solidFill>
-                  <a:schemeClr val="tx1">
-                    <a:lumMod val="65000"/>
-                    <a:lumOff val="35000"/>
-                  </a:schemeClr>
-                </a:solidFill>
-              </a:rPr>
-              <a:t>    [ </a:t>
-            </a:r>
-            <a:r>
-              <a:rPr lang="en-SG" sz="1000" dirty="0">
-                <a:solidFill>
-                  <a:schemeClr val="tx1">
-                    <a:lumMod val="65000"/>
-                    <a:lumOff val="35000"/>
-                  </a:schemeClr>
-                </a:solidFill>
-              </a:rPr>
-              <a:t>] The </a:t>
-            </a:r>
-            <a:r>
-              <a:rPr lang="en-SG" sz="1000" dirty="0" smtClean="0">
-                <a:solidFill>
-                  <a:schemeClr val="tx1">
-                    <a:lumMod val="65000"/>
-                    <a:lumOff val="35000"/>
-                  </a:schemeClr>
-                </a:solidFill>
-              </a:rPr>
-              <a:t>system </a:t>
-            </a:r>
-            <a:r>
-              <a:rPr lang="en-SG" sz="1000" dirty="0">
-                <a:solidFill>
-                  <a:schemeClr val="tx1">
-                    <a:lumMod val="65000"/>
-                    <a:lumOff val="35000"/>
-                  </a:schemeClr>
-                </a:solidFill>
-              </a:rPr>
-              <a:t>must be fast</a:t>
-            </a:r>
-          </a:p>
-          <a:p>
-            <a:r>
-              <a:rPr lang="en-SG" sz="1000" dirty="0">
-                <a:solidFill>
-                  <a:schemeClr val="tx1">
-                    <a:lumMod val="65000"/>
-                    <a:lumOff val="35000"/>
-                  </a:schemeClr>
-                </a:solidFill>
-              </a:rPr>
-              <a:t> </a:t>
-            </a:r>
-            <a:r>
-              <a:rPr lang="en-SG" sz="1000" dirty="0" smtClean="0">
-                <a:solidFill>
-                  <a:schemeClr val="tx1">
-                    <a:lumMod val="65000"/>
-                    <a:lumOff val="35000"/>
-                  </a:schemeClr>
-                </a:solidFill>
-              </a:rPr>
-              <a:t>    [ </a:t>
-            </a:r>
-            <a:r>
-              <a:rPr lang="en-SG" sz="1000" dirty="0">
-                <a:solidFill>
-                  <a:schemeClr val="tx1">
-                    <a:lumMod val="65000"/>
-                    <a:lumOff val="35000"/>
-                  </a:schemeClr>
-                </a:solidFill>
-              </a:rPr>
-              <a:t>] The </a:t>
-            </a:r>
-            <a:r>
-              <a:rPr lang="en-SG" sz="1000" dirty="0" smtClean="0">
-                <a:solidFill>
-                  <a:schemeClr val="tx1">
-                    <a:lumMod val="65000"/>
-                    <a:lumOff val="35000"/>
-                  </a:schemeClr>
-                </a:solidFill>
-              </a:rPr>
-              <a:t>system </a:t>
-            </a:r>
-            <a:r>
-              <a:rPr lang="en-SG" sz="1000" dirty="0">
-                <a:solidFill>
-                  <a:schemeClr val="tx1">
-                    <a:lumMod val="65000"/>
-                    <a:lumOff val="35000"/>
-                  </a:schemeClr>
-                </a:solidFill>
-              </a:rPr>
-              <a:t>must allow adding accounts</a:t>
-            </a:r>
           </a:p>
           <a:p>
             <a:r>
@@ -5144,8 +4967,8 @@
         </p:nvSpPr>
         <p:spPr>
           <a:xfrm>
-            <a:off x="5297424" y="5838110"/>
-            <a:ext cx="722376" cy="152400"/>
+            <a:off x="5562600" y="5838110"/>
+            <a:ext cx="457200" cy="152400"/>
           </a:xfrm>
           <a:prstGeom prst="roundRect">
             <a:avLst/>
@@ -5175,7 +4998,7 @@
           <a:bodyPr lIns="0" tIns="0" rIns="0" bIns="0" rtlCol="0" anchor="ctr"/>
           <a:lstStyle/>
           <a:p>
-            <a:pPr algn="ctr"/>
+            <a:pPr algn="r"/>
             <a:r>
               <a:rPr lang="en-US" sz="1000" dirty="0" smtClean="0">
                 <a:solidFill>
@@ -5185,7 +5008,7 @@
                   </a:schemeClr>
                 </a:solidFill>
               </a:rPr>
-              <a:t>advanced</a:t>
+              <a:t>[level5]</a:t>
             </a:r>
             <a:endParaRPr lang="en-SG" sz="1000" dirty="0">
               <a:solidFill>
@@ -5206,7 +5029,7 @@
         </p:nvSpPr>
         <p:spPr>
           <a:xfrm>
-            <a:off x="990600" y="6705600"/>
+            <a:off x="990600" y="6858000"/>
             <a:ext cx="838200" cy="152400"/>
           </a:xfrm>
           <a:prstGeom prst="roundRect">
@@ -5276,14 +5099,162 @@
       </p:sp>
       <p:sp>
         <p:nvSpPr>
-          <p:cNvPr id="35" name="Rounded Rectangle 34"/>
+          <p:cNvPr id="1025" name="Rectangle 1024"/>
           <p:cNvSpPr/>
           <p:nvPr/>
         </p:nvSpPr>
         <p:spPr>
           <a:xfrm>
-            <a:off x="1005840" y="7620000"/>
-            <a:ext cx="838200" cy="152400"/>
+            <a:off x="990600" y="6553200"/>
+            <a:ext cx="5029200" cy="228600"/>
+          </a:xfrm>
+          <a:prstGeom prst="rect">
+            <a:avLst/>
+          </a:prstGeom>
+          <a:ln>
+            <a:solidFill>
+              <a:schemeClr val="bg1">
+                <a:lumMod val="65000"/>
+              </a:schemeClr>
+            </a:solidFill>
+            <a:prstDash val="dash"/>
+          </a:ln>
+        </p:spPr>
+        <p:txBody>
+          <a:bodyPr wrap="square">
+            <a:noAutofit/>
+          </a:bodyPr>
+          <a:lstStyle/>
+          <a:p>
+            <a:r>
+              <a:rPr lang="en-US" sz="1000" dirty="0" smtClean="0">
+                <a:solidFill>
+                  <a:schemeClr val="tx1">
+                    <a:lumMod val="65000"/>
+                    <a:lumOff val="35000"/>
+                  </a:schemeClr>
+                </a:solidFill>
+              </a:rPr>
+              <a:t>Yes</a:t>
+            </a:r>
+            <a:endParaRPr lang="en-SG" sz="1000" dirty="0">
+              <a:solidFill>
+                <a:schemeClr val="tx1">
+                  <a:lumMod val="65000"/>
+                  <a:lumOff val="35000"/>
+                </a:schemeClr>
+              </a:solidFill>
+            </a:endParaRPr>
+          </a:p>
+        </p:txBody>
+      </p:sp>
+      <p:sp>
+        <p:nvSpPr>
+          <p:cNvPr id="1028" name="Rectangle 1027"/>
+          <p:cNvSpPr/>
+          <p:nvPr/>
+        </p:nvSpPr>
+        <p:spPr>
+          <a:xfrm>
+            <a:off x="4357053" y="4419600"/>
+            <a:ext cx="1676400" cy="838200"/>
+          </a:xfrm>
+          <a:prstGeom prst="rect">
+            <a:avLst/>
+          </a:prstGeom>
+          <a:solidFill>
+            <a:schemeClr val="bg1">
+              <a:lumMod val="95000"/>
+            </a:schemeClr>
+          </a:solidFill>
+          <a:ln w="6350">
+            <a:solidFill>
+              <a:srgbClr val="0070C0"/>
+            </a:solidFill>
+          </a:ln>
+          <a:effectLst/>
+        </p:spPr>
+        <p:style>
+          <a:lnRef idx="2">
+            <a:schemeClr val="accent1">
+              <a:shade val="50000"/>
+            </a:schemeClr>
+          </a:lnRef>
+          <a:fillRef idx="1">
+            <a:schemeClr val="accent1"/>
+          </a:fillRef>
+          <a:effectRef idx="0">
+            <a:schemeClr val="accent1"/>
+          </a:effectRef>
+          <a:fontRef idx="minor">
+            <a:schemeClr val="lt1"/>
+          </a:fontRef>
+        </p:style>
+        <p:txBody>
+          <a:bodyPr rtlCol="0" anchor="ctr"/>
+          <a:lstStyle/>
+          <a:p>
+            <a:r>
+              <a:rPr lang="en-SG" sz="1200" dirty="0" smtClean="0">
+                <a:solidFill>
+                  <a:srgbClr val="0070C0"/>
+                </a:solidFill>
+              </a:rPr>
+              <a:t>FRs </a:t>
+            </a:r>
+            <a:r>
+              <a:rPr lang="en-SG" sz="1200" dirty="0">
+                <a:solidFill>
+                  <a:srgbClr val="0070C0"/>
+                </a:solidFill>
+              </a:rPr>
+              <a:t>are about </a:t>
+            </a:r>
+            <a:r>
+              <a:rPr lang="en-SG" sz="1200" b="1" dirty="0">
+                <a:solidFill>
+                  <a:srgbClr val="0070C0"/>
+                </a:solidFill>
+              </a:rPr>
+              <a:t>WHAT</a:t>
+            </a:r>
+            <a:r>
+              <a:rPr lang="en-SG" sz="1200" dirty="0">
+                <a:solidFill>
+                  <a:srgbClr val="0070C0"/>
+                </a:solidFill>
+              </a:rPr>
+              <a:t> a system does; NFRS are about </a:t>
+            </a:r>
+            <a:r>
+              <a:rPr lang="en-SG" sz="1200" b="1" dirty="0">
+                <a:solidFill>
+                  <a:srgbClr val="0070C0"/>
+                </a:solidFill>
+              </a:rPr>
+              <a:t>HOW</a:t>
+            </a:r>
+            <a:r>
+              <a:rPr lang="en-SG" sz="1200" dirty="0">
+                <a:solidFill>
+                  <a:srgbClr val="0070C0"/>
+                </a:solidFill>
+              </a:rPr>
+              <a:t> the system does those things</a:t>
+            </a:r>
+          </a:p>
+        </p:txBody>
+      </p:sp>
+      <p:sp>
+        <p:nvSpPr>
+          <p:cNvPr id="32" name="Rounded Rectangle 31"/>
+          <p:cNvSpPr/>
+          <p:nvPr/>
+        </p:nvSpPr>
+        <p:spPr>
+          <a:xfrm>
+            <a:off x="5285824" y="6934200"/>
+            <a:ext cx="629752" cy="152400"/>
           </a:xfrm>
           <a:prstGeom prst="roundRect">
             <a:avLst/>
@@ -5337,7 +5308,7 @@
                   </a:schemeClr>
                 </a:solidFill>
               </a:rPr>
-              <a:t>Show answer</a:t>
+              <a:t>Next &gt;&gt;</a:t>
             </a:r>
             <a:endParaRPr lang="en-SG" sz="900" dirty="0">
               <a:solidFill>
@@ -5352,80 +5323,109 @@
       </p:sp>
       <p:sp>
         <p:nvSpPr>
-          <p:cNvPr id="1025" name="Rectangle 1024"/>
+          <p:cNvPr id="33" name="Rounded Rectangle 32"/>
           <p:cNvSpPr/>
           <p:nvPr/>
         </p:nvSpPr>
         <p:spPr>
           <a:xfrm>
-            <a:off x="990600" y="6400800"/>
-            <a:ext cx="5029200" cy="228600"/>
+            <a:off x="4572000" y="6934200"/>
+            <a:ext cx="629752" cy="152400"/>
           </a:xfrm>
-          <a:prstGeom prst="rect">
-            <a:avLst/>
-          </a:prstGeom>
-          <a:ln>
-            <a:solidFill>
-              <a:schemeClr val="bg1">
-                <a:lumMod val="65000"/>
-              </a:schemeClr>
-            </a:solidFill>
-            <a:prstDash val="dash"/>
-          </a:ln>
-        </p:spPr>
-        <p:txBody>
-          <a:bodyPr wrap="square">
-            <a:noAutofit/>
-          </a:bodyPr>
-          <a:lstStyle/>
-          <a:p>
-            <a:r>
-              <a:rPr lang="en-US" sz="1000" dirty="0" smtClean="0">
-                <a:solidFill>
-                  <a:schemeClr val="tx1">
-                    <a:lumMod val="65000"/>
-                    <a:lumOff val="35000"/>
-                  </a:schemeClr>
-                </a:solidFill>
-              </a:rPr>
-              <a:t>Yes</a:t>
-            </a:r>
-            <a:endParaRPr lang="en-SG" sz="1000" dirty="0">
-              <a:solidFill>
-                <a:schemeClr val="tx1">
-                  <a:lumMod val="65000"/>
-                  <a:lumOff val="35000"/>
-                </a:schemeClr>
-              </a:solidFill>
-            </a:endParaRPr>
-          </a:p>
-        </p:txBody>
-      </p:sp>
-      <p:sp>
-        <p:nvSpPr>
-          <p:cNvPr id="1028" name="Rectangle 1027"/>
-          <p:cNvSpPr/>
-          <p:nvPr/>
-        </p:nvSpPr>
-        <p:spPr>
-          <a:xfrm>
-            <a:off x="4357053" y="4419600"/>
-            <a:ext cx="1676400" cy="838200"/>
-          </a:xfrm>
-          <a:prstGeom prst="rect">
+          <a:prstGeom prst="roundRect">
             <a:avLst/>
           </a:prstGeom>
           <a:solidFill>
             <a:schemeClr val="bg1">
-              <a:lumMod val="95000"/>
+              <a:lumMod val="85000"/>
             </a:schemeClr>
           </a:solidFill>
-          <a:ln w="6350">
-            <a:solidFill>
-              <a:srgbClr val="0070C0"/>
-            </a:solidFill>
+          <a:ln>
+            <a:noFill/>
           </a:ln>
           <a:effectLst/>
+          <a:scene3d>
+            <a:camera prst="orthographicFront">
+              <a:rot lat="0" lon="0" rev="0"/>
+            </a:camera>
+            <a:lightRig rig="chilly" dir="t">
+              <a:rot lat="0" lon="0" rev="18480000"/>
+            </a:lightRig>
+          </a:scene3d>
+          <a:sp3d prstMaterial="clear">
+            <a:bevelT h="63500"/>
+          </a:sp3d>
+        </p:spPr>
+        <p:style>
+          <a:lnRef idx="0">
+            <a:schemeClr val="accent1"/>
+          </a:lnRef>
+          <a:fillRef idx="3">
+            <a:schemeClr val="accent1"/>
+          </a:fillRef>
+          <a:effectRef idx="3">
+            <a:schemeClr val="accent1"/>
+          </a:effectRef>
+          <a:fontRef idx="minor">
+            <a:schemeClr val="lt1"/>
+          </a:fontRef>
+        </p:style>
+        <p:txBody>
+          <a:bodyPr rtlCol="0" anchor="ctr"/>
+          <a:lstStyle/>
+          <a:p>
+            <a:pPr algn="ctr"/>
+            <a:r>
+              <a:rPr lang="en-US" sz="900" dirty="0" smtClean="0">
+                <a:solidFill>
+                  <a:schemeClr val="tx1">
+                    <a:lumMod val="50000"/>
+                    <a:lumOff val="50000"/>
+                  </a:schemeClr>
+                </a:solidFill>
+              </a:rPr>
+              <a:t>&lt;&lt; </a:t>
+            </a:r>
+            <a:r>
+              <a:rPr lang="en-US" sz="900" dirty="0" err="1" smtClean="0">
+                <a:solidFill>
+                  <a:schemeClr val="tx1">
+                    <a:lumMod val="50000"/>
+                    <a:lumOff val="50000"/>
+                  </a:schemeClr>
+                </a:solidFill>
+              </a:rPr>
+              <a:t>Prev</a:t>
+            </a:r>
+            <a:endParaRPr lang="en-SG" sz="900" dirty="0">
+              <a:solidFill>
+                <a:schemeClr val="tx1">
+                  <a:lumMod val="50000"/>
+                  <a:lumOff val="50000"/>
+                </a:schemeClr>
+              </a:solidFill>
+            </a:endParaRPr>
+          </a:p>
+        </p:txBody>
+      </p:sp>
+      <p:sp>
+        <p:nvSpPr>
+          <p:cNvPr id="34" name="Rounded Rectangle 33"/>
+          <p:cNvSpPr/>
+          <p:nvPr/>
+        </p:nvSpPr>
+        <p:spPr>
+          <a:xfrm>
+            <a:off x="5600699" y="6305550"/>
+            <a:ext cx="432753" cy="152400"/>
+          </a:xfrm>
+          <a:prstGeom prst="roundRect">
+            <a:avLst/>
+          </a:prstGeom>
+          <a:noFill/>
+          <a:ln>
+            <a:noFill/>
+          </a:ln>
         </p:spPr>
         <p:style>
           <a:lnRef idx="2">
@@ -5444,57 +5444,91 @@
           </a:fontRef>
         </p:style>
         <p:txBody>
-          <a:bodyPr rtlCol="0" anchor="ctr"/>
+          <a:bodyPr lIns="0" tIns="0" rIns="0" bIns="0" rtlCol="0" anchor="ctr"/>
           <a:lstStyle/>
           <a:p>
-            <a:r>
-              <a:rPr lang="en-SG" sz="1200" dirty="0" smtClean="0">
-                <a:solidFill>
-                  <a:srgbClr val="0070C0"/>
-                </a:solidFill>
-              </a:rPr>
-              <a:t>FRs </a:t>
-            </a:r>
-            <a:r>
-              <a:rPr lang="en-SG" sz="1200" dirty="0">
-                <a:solidFill>
-                  <a:srgbClr val="0070C0"/>
-                </a:solidFill>
-              </a:rPr>
-              <a:t>are about </a:t>
-            </a:r>
-            <a:r>
-              <a:rPr lang="en-SG" sz="1200" b="1" dirty="0">
-                <a:solidFill>
-                  <a:srgbClr val="0070C0"/>
-                </a:solidFill>
-              </a:rPr>
-              <a:t>WHAT</a:t>
-            </a:r>
-            <a:r>
-              <a:rPr lang="en-SG" sz="1200" dirty="0">
-                <a:solidFill>
-                  <a:srgbClr val="0070C0"/>
-                </a:solidFill>
-              </a:rPr>
-              <a:t> a system does; NFRS are about </a:t>
-            </a:r>
-            <a:r>
-              <a:rPr lang="en-SG" sz="1200" b="1" dirty="0">
-                <a:solidFill>
-                  <a:srgbClr val="0070C0"/>
-                </a:solidFill>
-              </a:rPr>
-              <a:t>HOW</a:t>
-            </a:r>
-            <a:r>
-              <a:rPr lang="en-SG" sz="1200" dirty="0">
-                <a:solidFill>
-                  <a:srgbClr val="0070C0"/>
-                </a:solidFill>
-              </a:rPr>
-              <a:t> the system does those things</a:t>
-            </a:r>
+            <a:pPr algn="r"/>
+            <a:r>
+              <a:rPr lang="en-US" sz="1000" dirty="0" smtClean="0">
+                <a:solidFill>
+                  <a:schemeClr val="tx2">
+                    <a:lumMod val="60000"/>
+                    <a:lumOff val="40000"/>
+                  </a:schemeClr>
+                </a:solidFill>
+              </a:rPr>
+              <a:t>[level2]</a:t>
+            </a:r>
+            <a:endParaRPr lang="en-SG" sz="1000" dirty="0">
+              <a:solidFill>
+                <a:schemeClr val="tx2">
+                  <a:lumMod val="60000"/>
+                  <a:lumOff val="40000"/>
+                </a:schemeClr>
+              </a:solidFill>
+            </a:endParaRPr>
+          </a:p>
+        </p:txBody>
+      </p:sp>
+      <p:sp>
+        <p:nvSpPr>
+          <p:cNvPr id="36" name="Rounded Rectangle 35"/>
+          <p:cNvSpPr/>
+          <p:nvPr/>
+        </p:nvSpPr>
+        <p:spPr>
+          <a:xfrm>
+            <a:off x="5192865" y="6305550"/>
+            <a:ext cx="432753" cy="152400"/>
+          </a:xfrm>
+          <a:prstGeom prst="roundRect">
+            <a:avLst/>
+          </a:prstGeom>
+          <a:noFill/>
+          <a:ln>
+            <a:noFill/>
+          </a:ln>
+        </p:spPr>
+        <p:style>
+          <a:lnRef idx="2">
+            <a:schemeClr val="accent1">
+              <a:shade val="50000"/>
+            </a:schemeClr>
+          </a:lnRef>
+          <a:fillRef idx="1">
+            <a:schemeClr val="accent1"/>
+          </a:fillRef>
+          <a:effectRef idx="0">
+            <a:schemeClr val="accent1"/>
+          </a:effectRef>
+          <a:fontRef idx="minor">
+            <a:schemeClr val="lt1"/>
+          </a:fontRef>
+        </p:style>
+        <p:txBody>
+          <a:bodyPr lIns="0" tIns="0" rIns="0" bIns="0" rtlCol="0" anchor="ctr"/>
+          <a:lstStyle/>
+          <a:p>
+            <a:pPr algn="r"/>
+            <a:r>
+              <a:rPr lang="en-US" sz="1000" dirty="0" smtClean="0">
+                <a:solidFill>
+                  <a:schemeClr val="tx1">
+                    <a:lumMod val="50000"/>
+                    <a:lumOff val="50000"/>
+                  </a:schemeClr>
+                </a:solidFill>
+              </a:rPr>
+              <a:t>[prep]</a:t>
+            </a:r>
+            <a:endParaRPr lang="en-SG" sz="1000" dirty="0">
+              <a:solidFill>
+                <a:schemeClr val="tx1">
+                  <a:lumMod val="50000"/>
+                  <a:lumOff val="50000"/>
+                </a:schemeClr>
+              </a:solidFill>
+            </a:endParaRPr>
           </a:p>
         </p:txBody>
       </p:sp>
@@ -6279,14 +6313,6 @@
               </a:rPr>
               <a:t>with requirements is a complicated task. It is not as simple as writing a wish list.</a:t>
             </a:r>
-            <a:endParaRPr lang="en-SG" sz="1000" dirty="0">
-              <a:solidFill>
-                <a:schemeClr val="tx1">
-                  <a:lumMod val="65000"/>
-                  <a:lumOff val="35000"/>
-                </a:schemeClr>
-              </a:solidFill>
-            </a:endParaRPr>
           </a:p>
         </p:txBody>
       </p:sp>
@@ -7243,14 +7269,6 @@
               </a:rPr>
               <a:t>] The system must allow adding accounts</a:t>
             </a:r>
-            <a:endParaRPr lang="en-SG" sz="1000" dirty="0">
-              <a:solidFill>
-                <a:schemeClr val="tx1">
-                  <a:lumMod val="65000"/>
-                  <a:lumOff val="35000"/>
-                </a:schemeClr>
-              </a:solidFill>
-            </a:endParaRPr>
           </a:p>
         </p:txBody>
       </p:sp>
@@ -7868,15 +7886,7 @@
             </a:r>
             <a:r>
               <a:rPr lang="en-SG" sz="800" dirty="0"/>
-              <a:t>taken from </a:t>
-            </a:r>
-            <a:r>
-              <a:rPr lang="en-SG" sz="800" dirty="0"/>
-              <a:t>[http://balsamiq.com/]</a:t>
-            </a:r>
-            <a:r>
-              <a:rPr lang="en-SG" sz="800" dirty="0"/>
-              <a:t>(</a:t>
+              <a:t>taken from [http://balsamiq.com/](</a:t>
             </a:r>
             <a:r>
               <a:rPr lang="en-SG" sz="800" i="1" dirty="0"/>

</xml_diff>